<commit_message>
BRE 01 Lizenzen erneuert
</commit_message>
<xml_diff>
--- a/training-cards/music moves/BREAKS (BRE)/ger/apprentice/ger_BRE_01_wenn_nichts_tun_mehr_bringt_MM_A.pptx
+++ b/training-cards/music moves/BREAKS (BRE)/ger/apprentice/ger_BRE_01_wenn_nichts_tun_mehr_bringt_MM_A.pptx
@@ -105,6 +105,22 @@
       </a:defRPr>
     </a:lvl9pPr>
   </p:defaultTextStyle>
+  <p:extLst>
+    <p:ext uri="{EFAFB233-063F-42B5-8137-9DF3F51BA10A}">
+      <p15:sldGuideLst xmlns:p15="http://schemas.microsoft.com/office/powerpoint/2012/main">
+        <p15:guide id="1" orient="horz" pos="872">
+          <p15:clr>
+            <a:srgbClr val="A4A3A4"/>
+          </p15:clr>
+        </p15:guide>
+        <p15:guide id="2" pos="735">
+          <p15:clr>
+            <a:srgbClr val="A4A3A4"/>
+          </p15:clr>
+        </p15:guide>
+      </p15:sldGuideLst>
+    </p:ext>
+  </p:extLst>
 </p:presentation>
 </file>
 
@@ -150,7 +166,7 @@
           </a:lstStyle>
           <a:p>
             <a:r>
-              <a:rPr lang="de-DE" smtClean="0"/>
+              <a:rPr lang="de-DE"/>
               <a:t>Mastertitelformat bearbeiten</a:t>
             </a:r>
             <a:endParaRPr lang="de-DE" dirty="0"/>
@@ -271,7 +287,7 @@
           </a:lstStyle>
           <a:p>
             <a:r>
-              <a:rPr lang="de-DE" smtClean="0"/>
+              <a:rPr lang="de-DE"/>
               <a:t>Master-Untertitelformat bearbeiten</a:t>
             </a:r>
             <a:endParaRPr lang="de-DE" dirty="0"/>
@@ -305,35 +321,35 @@
           <a:p>
             <a:pPr lvl="0"/>
             <a:r>
-              <a:rPr lang="de-DE" smtClean="0"/>
+              <a:rPr lang="de-DE"/>
               <a:t>Mastertextformat bearbeiten</a:t>
             </a:r>
           </a:p>
           <a:p>
             <a:pPr lvl="1"/>
             <a:r>
-              <a:rPr lang="de-DE" smtClean="0"/>
+              <a:rPr lang="de-DE"/>
               <a:t>Zweite Ebene</a:t>
             </a:r>
           </a:p>
           <a:p>
             <a:pPr lvl="2"/>
             <a:r>
-              <a:rPr lang="de-DE" smtClean="0"/>
+              <a:rPr lang="de-DE"/>
               <a:t>Dritte Ebene</a:t>
             </a:r>
           </a:p>
           <a:p>
             <a:pPr lvl="3"/>
             <a:r>
-              <a:rPr lang="de-DE" smtClean="0"/>
+              <a:rPr lang="de-DE"/>
               <a:t>Vierte Ebene</a:t>
             </a:r>
           </a:p>
           <a:p>
             <a:pPr lvl="4"/>
             <a:r>
-              <a:rPr lang="de-DE" smtClean="0"/>
+              <a:rPr lang="de-DE"/>
               <a:t>Fünfte Ebene</a:t>
             </a:r>
             <a:endParaRPr lang="de-DE" dirty="0"/>
@@ -449,35 +465,35 @@
           <a:p>
             <a:pPr lvl="0"/>
             <a:r>
-              <a:rPr lang="de-DE" smtClean="0"/>
+              <a:rPr lang="de-DE"/>
               <a:t>Mastertextformat bearbeiten</a:t>
             </a:r>
           </a:p>
           <a:p>
             <a:pPr lvl="1"/>
             <a:r>
-              <a:rPr lang="de-DE" smtClean="0"/>
+              <a:rPr lang="de-DE"/>
               <a:t>Zweite Ebene</a:t>
             </a:r>
           </a:p>
           <a:p>
             <a:pPr lvl="2"/>
             <a:r>
-              <a:rPr lang="de-DE" smtClean="0"/>
+              <a:rPr lang="de-DE"/>
               <a:t>Dritte Ebene</a:t>
             </a:r>
           </a:p>
           <a:p>
             <a:pPr lvl="3"/>
             <a:r>
-              <a:rPr lang="de-DE" smtClean="0"/>
+              <a:rPr lang="de-DE"/>
               <a:t>Vierte Ebene</a:t>
             </a:r>
           </a:p>
           <a:p>
             <a:pPr lvl="4"/>
             <a:r>
-              <a:rPr lang="de-DE" smtClean="0"/>
+              <a:rPr lang="de-DE"/>
               <a:t>Fünfte Ebene</a:t>
             </a:r>
             <a:endParaRPr lang="de-DE" dirty="0"/>
@@ -507,7 +523,7 @@
           <a:lstStyle/>
           <a:p>
             <a:r>
-              <a:rPr lang="de-DE" sz="2400" dirty="0" smtClean="0">
+              <a:rPr lang="de-DE" sz="2400" dirty="0">
                 <a:solidFill>
                   <a:srgbClr val="7E006B"/>
                 </a:solidFill>
@@ -517,7 +533,7 @@
               <a:t>TR	AININGS</a:t>
             </a:r>
             <a:r>
-              <a:rPr lang="de-DE" sz="2400" dirty="0" smtClean="0">
+              <a:rPr lang="de-DE" sz="2400" dirty="0">
                 <a:solidFill>
                   <a:srgbClr val="7E006B"/>
                 </a:solidFill>
@@ -612,10 +628,9 @@
           <a:lstStyle/>
           <a:p>
             <a:r>
-              <a:rPr lang="de-DE" smtClean="0"/>
+              <a:rPr lang="de-DE"/>
               <a:t>Mastertitelformat bearbeiten</a:t>
             </a:r>
-            <a:endParaRPr lang="de-DE"/>
           </a:p>
         </p:txBody>
       </p:sp>
@@ -636,7 +651,7 @@
           <a:p>
             <a:fld id="{FF5B2BAF-DF38-0A48-A798-0C06E514FD52}" type="datetimeFigureOut">
               <a:rPr lang="de-DE" smtClean="0"/>
-              <a:t>07.06.15</a:t>
+              <a:t>26.07.23</a:t>
             </a:fld>
             <a:endParaRPr lang="de-DE" dirty="0"/>
           </a:p>
@@ -747,17 +762,16 @@
           <a:p>
             <a:pPr marL="0" lvl="0" algn="l"/>
             <a:r>
-              <a:rPr lang="de-DE" dirty="0" smtClean="0"/>
+              <a:rPr lang="de-DE" dirty="0"/>
               <a:t>Überschrift </a:t>
             </a:r>
             <a:br>
-              <a:rPr lang="de-DE" dirty="0" smtClean="0"/>
+              <a:rPr lang="de-DE" dirty="0"/>
             </a:br>
             <a:r>
-              <a:rPr lang="de-DE" dirty="0" smtClean="0"/>
+              <a:rPr lang="de-DE" dirty="0"/>
               <a:t>bearbeiten </a:t>
             </a:r>
-            <a:endParaRPr lang="de-DE" dirty="0"/>
           </a:p>
         </p:txBody>
       </p:sp>
@@ -788,38 +802,37 @@
           <a:p>
             <a:pPr lvl="0"/>
             <a:r>
-              <a:rPr lang="de-DE" dirty="0" smtClean="0"/>
+              <a:rPr lang="de-DE" dirty="0"/>
               <a:t>Mastertextformat bearbeiten</a:t>
             </a:r>
           </a:p>
           <a:p>
             <a:pPr lvl="1"/>
             <a:r>
-              <a:rPr lang="de-DE" dirty="0" smtClean="0"/>
+              <a:rPr lang="de-DE" dirty="0"/>
               <a:t>Zweite Ebene</a:t>
             </a:r>
           </a:p>
           <a:p>
             <a:pPr lvl="2"/>
             <a:r>
-              <a:rPr lang="de-DE" dirty="0" smtClean="0"/>
+              <a:rPr lang="de-DE" dirty="0"/>
               <a:t>Dritte Ebene</a:t>
             </a:r>
           </a:p>
           <a:p>
             <a:pPr lvl="3"/>
             <a:r>
-              <a:rPr lang="de-DE" dirty="0" smtClean="0"/>
+              <a:rPr lang="de-DE" dirty="0"/>
               <a:t>Vierte Ebene</a:t>
             </a:r>
           </a:p>
           <a:p>
             <a:pPr lvl="4"/>
             <a:r>
-              <a:rPr lang="de-DE" dirty="0" smtClean="0"/>
+              <a:rPr lang="de-DE" dirty="0"/>
               <a:t>Fünfte Ebene</a:t>
             </a:r>
-            <a:endParaRPr lang="de-DE" dirty="0"/>
           </a:p>
         </p:txBody>
       </p:sp>
@@ -858,7 +871,7 @@
           <a:p>
             <a:fld id="{FF5B2BAF-DF38-0A48-A798-0C06E514FD52}" type="datetimeFigureOut">
               <a:rPr lang="de-DE" smtClean="0"/>
-              <a:t>07.06.15</a:t>
+              <a:t>26.07.23</a:t>
             </a:fld>
             <a:endParaRPr lang="de-DE" dirty="0"/>
           </a:p>
@@ -1092,7 +1105,7 @@
           <a:lstStyle/>
           <a:p>
             <a:r>
-              <a:rPr lang="de-DE" sz="1050" b="1" dirty="0" smtClean="0">
+              <a:rPr lang="de-DE" sz="1050" b="1" dirty="0">
                 <a:solidFill>
                   <a:schemeClr val="bg1"/>
                 </a:solidFill>
@@ -1102,7 +1115,7 @@
               <a:t>TRAININGSKARTE</a:t>
             </a:r>
             <a:r>
-              <a:rPr lang="de-DE" sz="1050" dirty="0" smtClean="0">
+              <a:rPr lang="de-DE" sz="1050" dirty="0">
                 <a:solidFill>
                   <a:schemeClr val="bg1"/>
                 </a:solidFill>
@@ -1112,7 +1125,7 @@
               <a:t> </a:t>
             </a:r>
             <a:r>
-              <a:rPr lang="de-DE" sz="1050" b="1" dirty="0" smtClean="0">
+              <a:rPr lang="de-DE" sz="1050" b="1" dirty="0">
                 <a:solidFill>
                   <a:schemeClr val="bg1"/>
                 </a:solidFill>
@@ -1121,13 +1134,6 @@
               </a:rPr>
               <a:t>BRE 01</a:t>
             </a:r>
-            <a:endParaRPr lang="de-DE" sz="1050" b="1" dirty="0">
-              <a:solidFill>
-                <a:schemeClr val="bg1"/>
-              </a:solidFill>
-              <a:latin typeface="Avenir Heavy"/>
-              <a:cs typeface="Avenir Heavy"/>
-            </a:endParaRPr>
           </a:p>
         </p:txBody>
       </p:sp>
@@ -1505,10 +1511,9 @@
           <a:lstStyle/>
           <a:p>
             <a:r>
-              <a:rPr lang="de-DE" dirty="0" smtClean="0"/>
+              <a:rPr lang="de-DE" dirty="0"/>
               <a:t>WENN NICHTS TUN</a:t>
             </a:r>
-            <a:endParaRPr lang="de-DE" dirty="0"/>
           </a:p>
         </p:txBody>
       </p:sp>
@@ -1528,10 +1533,9 @@
           <a:lstStyle/>
           <a:p>
             <a:r>
-              <a:rPr lang="de-DE" dirty="0" smtClean="0"/>
+              <a:rPr lang="de-DE" dirty="0"/>
               <a:t>MEHR BRINGT...</a:t>
             </a:r>
-            <a:endParaRPr lang="de-DE" dirty="0"/>
           </a:p>
         </p:txBody>
       </p:sp>
@@ -1552,37 +1556,17 @@
           <a:p>
             <a:r>
               <a:rPr lang="de-DE" dirty="0"/>
-              <a:t>Jedes gute Üben braucht Pausen. Nicht nur weil der Körper sich ausruhen muss, sondern weil </a:t>
-            </a:r>
-            <a:r>
-              <a:rPr lang="de-DE" dirty="0" smtClean="0"/>
-              <a:t>eine Pause manchmal mehr Effekt hat, </a:t>
-            </a:r>
-            <a:r>
-              <a:rPr lang="de-DE" dirty="0"/>
-              <a:t>als wenn man weiter übt.</a:t>
-            </a:r>
-          </a:p>
-          <a:p>
-            <a:r>
-              <a:rPr lang="de-DE" dirty="0"/>
-              <a:t>Wenn man </a:t>
-            </a:r>
-            <a:r>
-              <a:rPr lang="de-DE" dirty="0" smtClean="0"/>
-              <a:t>Neues </a:t>
-            </a:r>
-            <a:r>
-              <a:rPr lang="de-DE" dirty="0"/>
-              <a:t>lernt, braucht man Zeit </a:t>
+              <a:t>Jedes gute Üben braucht Pausen. Nicht nur weil der Körper sich ausruhen muss, sondern weil eine Pause manchmal mehr Effekt hat, als wenn man weiter übt.</a:t>
+            </a:r>
+          </a:p>
+          <a:p>
+            <a:r>
+              <a:rPr lang="de-DE" dirty="0"/>
+              <a:t>Wenn man Neues lernt, braucht man Zeit </a:t>
             </a:r>
             <a:r>
               <a:rPr lang="de-DE"/>
-              <a:t>um </a:t>
-            </a:r>
-            <a:r>
-              <a:rPr lang="de-DE" smtClean="0"/>
-              <a:t>es zu </a:t>
+              <a:t>um es zu </a:t>
             </a:r>
             <a:r>
               <a:rPr lang="de-DE" dirty="0"/>
@@ -1598,15 +1582,7 @@
           <a:p>
             <a:r>
               <a:rPr lang="de-DE" dirty="0"/>
-              <a:t>Man kann eine </a:t>
-            </a:r>
-            <a:r>
-              <a:rPr lang="de-DE" dirty="0" smtClean="0"/>
-              <a:t>Wahrnehmung </a:t>
-            </a:r>
-            <a:r>
-              <a:rPr lang="de-DE" dirty="0"/>
-              <a:t>entwickeln, wann man so gut geübt hat, dass es von alleine weiterwirkt.</a:t>
+              <a:t>Man kann eine Wahrnehmung entwickeln, wann man so gut geübt hat, dass es von alleine weiterwirkt.</a:t>
             </a:r>
           </a:p>
           <a:p>
@@ -1679,7 +1655,7 @@
         </p:nvSpPr>
         <p:spPr>
           <a:xfrm>
-            <a:off x="858838" y="1555750"/>
+            <a:off x="858838" y="1475464"/>
             <a:ext cx="6011545" cy="3214121"/>
           </a:xfrm>
         </p:spPr>
@@ -1701,16 +1677,11 @@
               <a:rPr lang="de-DE" dirty="0"/>
               <a:t>. </a:t>
             </a:r>
-            <a:endParaRPr lang="de-DE" dirty="0" smtClean="0"/>
-          </a:p>
-          <a:p>
-            <a:r>
-              <a:rPr lang="de-DE" dirty="0" smtClean="0"/>
-              <a:t>Dokumentiere </a:t>
-            </a:r>
-            <a:r>
-              <a:rPr lang="de-DE" dirty="0"/>
-              <a:t>bei allen </a:t>
+          </a:p>
+          <a:p>
+            <a:r>
+              <a:rPr lang="de-DE" dirty="0"/>
+              <a:t>Dokumentiere bei allen </a:t>
             </a:r>
             <a:r>
               <a:rPr lang="de-DE" dirty="0" err="1"/>
@@ -1718,91 +1689,44 @@
             </a:r>
             <a:r>
               <a:rPr lang="de-DE" dirty="0"/>
-              <a:t> zu Beginn und am Ende wie es </a:t>
-            </a:r>
-            <a:r>
-              <a:rPr lang="de-DE" dirty="0" smtClean="0"/>
-              <a:t>Dir </a:t>
-            </a:r>
-            <a:r>
-              <a:rPr lang="de-DE" dirty="0"/>
-              <a:t>geht und die Länge der Pause, die Du dazwischen gemacht </a:t>
-            </a:r>
-            <a:r>
-              <a:rPr lang="de-DE" dirty="0" smtClean="0"/>
-              <a:t>hast</a:t>
-            </a:r>
-            <a:r>
-              <a:rPr lang="de-DE" dirty="0" smtClean="0"/>
-              <a:t>.</a:t>
-            </a:r>
-            <a:endParaRPr lang="de-DE" dirty="0" smtClean="0"/>
+              <a:t> zu Beginn und am Ende wie es Dir geht und die Länge der Pause, die Du dazwischen gemacht hast.</a:t>
+            </a:r>
           </a:p>
           <a:p>
             <a:pPr lvl="1"/>
             <a:r>
-              <a:rPr lang="de-DE" dirty="0" smtClean="0"/>
-              <a:t>Wahrnehmungsfragen </a:t>
-            </a:r>
-            <a:r>
-              <a:rPr lang="de-DE" dirty="0"/>
-              <a:t>nach dem Üben: </a:t>
-            </a:r>
-            <a:endParaRPr lang="de-DE" dirty="0" smtClean="0"/>
+              <a:rPr lang="de-DE" dirty="0"/>
+              <a:t>Wahrnehmungsfragen nach dem Üben: </a:t>
+            </a:r>
           </a:p>
           <a:p>
             <a:pPr marL="806450" lvl="2" indent="0">
               <a:buNone/>
             </a:pPr>
             <a:r>
-              <a:rPr lang="de-DE" dirty="0" smtClean="0"/>
-              <a:t>								Hast </a:t>
-            </a:r>
-            <a:r>
-              <a:rPr lang="de-DE" dirty="0"/>
-              <a:t>Du Deine Musikalität </a:t>
-            </a:r>
-            <a:r>
-              <a:rPr lang="de-DE" dirty="0" err="1"/>
-              <a:t>angestupst</a:t>
-            </a:r>
-            <a:r>
-              <a:rPr lang="de-DE" dirty="0"/>
-              <a:t>? </a:t>
+              <a:rPr lang="de-DE" dirty="0"/>
+              <a:t>Spürst du wie die Musik in die weiter schwingt? </a:t>
             </a:r>
             <a:br>
               <a:rPr lang="de-DE" dirty="0"/>
             </a:br>
             <a:r>
               <a:rPr lang="de-DE" dirty="0"/>
-              <a:t>Spürst Du in Dir Energie, die Dich weiter trägt? </a:t>
+              <a:t>Fühlst Du in Dir Energie, die Dich weiter trägt? </a:t>
             </a:r>
             <a:br>
               <a:rPr lang="de-DE" dirty="0"/>
             </a:br>
             <a:r>
               <a:rPr lang="de-DE" dirty="0"/>
-              <a:t>Wie geht´s Dir direkt nach dem Üben</a:t>
-            </a:r>
-            <a:r>
-              <a:rPr lang="de-DE" dirty="0" smtClean="0"/>
-              <a:t>?</a:t>
-            </a:r>
-            <a:endParaRPr lang="de-DE" dirty="0" smtClean="0"/>
+              <a:t>Wie geht es Dir direkt nach dem Üben?</a:t>
+            </a:r>
           </a:p>
           <a:p>
             <a:pPr lvl="1"/>
             <a:r>
-              <a:rPr lang="de-DE" dirty="0" smtClean="0"/>
-              <a:t>Wahrnehmungsfragen </a:t>
-            </a:r>
-            <a:r>
-              <a:rPr lang="de-DE" dirty="0"/>
-              <a:t>vor dem </a:t>
-            </a:r>
-            <a:r>
-              <a:rPr lang="de-DE" dirty="0" smtClean="0"/>
-              <a:t>Üben:</a:t>
+              <a:rPr lang="de-DE" dirty="0"/>
+              <a:t>Wahrnehmungsfragen vor dem Üben:</a:t>
             </a:r>
           </a:p>
           <a:p>
@@ -1835,57 +1759,39 @@
             </a:br>
             <a:r>
               <a:rPr lang="de-DE" dirty="0"/>
-              <a:t>Hast Du Lust zu Üben, weil es das letzte Mal so schön war</a:t>
-            </a:r>
-            <a:r>
-              <a:rPr lang="de-DE" dirty="0" smtClean="0"/>
-              <a:t>?</a:t>
+              <a:t>Hast Du Lust zu Üben, weil es das letzte Mal so schön war?</a:t>
             </a:r>
           </a:p>
           <a:p>
             <a:pPr lvl="1"/>
             <a:r>
-              <a:rPr lang="de-DE" dirty="0" smtClean="0"/>
-              <a:t>Wahrnehmungsfragen</a:t>
-            </a:r>
-            <a:r>
-              <a:rPr lang="de-DE" dirty="0"/>
-              <a:t>, die Du zu Beginn während des Übens für Dich </a:t>
+              <a:rPr lang="de-DE" dirty="0"/>
+              <a:t>Wahrnehmungsfragen, die Du zu Beginn während des Übens für Dich </a:t>
             </a:r>
             <a:br>
               <a:rPr lang="de-DE" dirty="0"/>
             </a:br>
             <a:r>
               <a:rPr lang="de-DE" dirty="0"/>
-              <a:t>überprüfen </a:t>
-            </a:r>
-            <a:r>
-              <a:rPr lang="de-DE" dirty="0" smtClean="0"/>
-              <a:t>kannst:</a:t>
-            </a:r>
-            <a:endParaRPr lang="de-DE" dirty="0"/>
+              <a:t>überprüfen kannst:</a:t>
+            </a:r>
           </a:p>
           <a:p>
             <a:pPr marL="806450" lvl="2" indent="0">
               <a:buNone/>
             </a:pPr>
             <a:r>
-              <a:rPr lang="de-DE" dirty="0" smtClean="0"/>
-              <a:t>Ob </a:t>
-            </a:r>
-            <a:r>
-              <a:rPr lang="de-DE" dirty="0"/>
-              <a:t>und wie hat sich Dein Musizieren durch die Pause verbessert? </a:t>
-            </a:r>
-            <a:endParaRPr lang="de-DE" dirty="0" smtClean="0"/>
+              <a:rPr lang="de-DE" dirty="0"/>
+              <a:t>Ob und wie hat sich Dein Musizieren durch die Pause verbessert? </a:t>
+            </a:r>
           </a:p>
           <a:p>
             <a:pPr marL="806450" lvl="2" indent="0">
               <a:buNone/>
             </a:pPr>
             <a:r>
-              <a:rPr lang="de-DE" dirty="0" smtClean="0"/>
-              <a:t>Hat es sich verschlechtert?</a:t>
+              <a:rPr lang="de-DE" dirty="0"/>
+              <a:t>Hat es sich verschlechtert oder ist gleich geblieben?</a:t>
             </a:r>
           </a:p>
           <a:p>
@@ -1893,16 +1799,320 @@
               <a:buNone/>
             </a:pPr>
             <a:r>
-              <a:rPr lang="de-DE" dirty="0" smtClean="0"/>
-              <a:t>Konntest </a:t>
-            </a:r>
-            <a:r>
-              <a:rPr lang="de-DE" dirty="0"/>
-              <a:t>Du etwas nach der Pause besser als vorher?</a:t>
+              <a:rPr lang="de-DE" dirty="0"/>
+              <a:t>Konntest Du etwas nach der Pause besser als vorher?</a:t>
             </a:r>
           </a:p>
         </p:txBody>
       </p:sp>
+      <p:sp>
+        <p:nvSpPr>
+          <p:cNvPr id="3" name="Shape 7">
+            <a:extLst>
+              <a:ext uri="{FF2B5EF4-FFF2-40B4-BE49-F238E27FC236}">
+                <a16:creationId xmlns:a16="http://schemas.microsoft.com/office/drawing/2014/main" id="{7D273F5D-BCCE-1896-36FA-B3F0B5FB8BE7}"/>
+              </a:ext>
+            </a:extLst>
+          </p:cNvPr>
+          <p:cNvSpPr/>
+          <p:nvPr/>
+        </p:nvSpPr>
+        <p:spPr>
+          <a:xfrm>
+            <a:off x="971550" y="4689585"/>
+            <a:ext cx="4691860" cy="461661"/>
+          </a:xfrm>
+          <a:prstGeom prst="rect">
+            <a:avLst/>
+          </a:prstGeom>
+          <a:ln w="12700">
+            <a:miter lim="400000"/>
+          </a:ln>
+          <a:extLst>
+            <a:ext uri="{C572A759-6A51-4108-AA02-DFA0A04FC94B}">
+              <ma14:wrappingTextBoxFlag xmlns:ma14="http://schemas.microsoft.com/office/mac/drawingml/2011/main" xmlns="" val="1"/>
+            </a:ext>
+          </a:extLst>
+        </p:spPr>
+        <p:txBody>
+          <a:bodyPr wrap="square" lIns="45718" tIns="45718" rIns="45718" bIns="45718">
+            <a:spAutoFit/>
+          </a:bodyPr>
+          <a:lstStyle/>
+          <a:p>
+            <a:pPr lvl="0" algn="ctr">
+              <a:defRPr sz="1800"/>
+            </a:pPr>
+            <a:r>
+              <a:rPr lang="de-DE" sz="800" b="0" i="0" u="none" strike="noStrike" dirty="0" err="1">
+                <a:solidFill>
+                  <a:schemeClr val="tx1">
+                    <a:lumMod val="65000"/>
+                    <a:lumOff val="35000"/>
+                  </a:schemeClr>
+                </a:solidFill>
+                <a:effectLst/>
+                <a:latin typeface="Avenir Book" panose="02000503020000020003" pitchFamily="2" charset="0"/>
+              </a:rPr>
+              <a:t>music</a:t>
+            </a:r>
+            <a:r>
+              <a:rPr lang="de-DE" sz="800" b="0" i="0" u="none" strike="noStrike" dirty="0">
+                <a:solidFill>
+                  <a:schemeClr val="tx1">
+                    <a:lumMod val="65000"/>
+                    <a:lumOff val="35000"/>
+                  </a:schemeClr>
+                </a:solidFill>
+                <a:effectLst/>
+                <a:latin typeface="Avenir Book" panose="02000503020000020003" pitchFamily="2" charset="0"/>
+              </a:rPr>
+              <a:t> </a:t>
+            </a:r>
+            <a:r>
+              <a:rPr lang="de-DE" sz="800" b="0" i="0" u="none" strike="noStrike" dirty="0" err="1">
+                <a:solidFill>
+                  <a:schemeClr val="tx1">
+                    <a:lumMod val="65000"/>
+                    <a:lumOff val="35000"/>
+                  </a:schemeClr>
+                </a:solidFill>
+                <a:effectLst/>
+                <a:latin typeface="Avenir Book" panose="02000503020000020003" pitchFamily="2" charset="0"/>
+              </a:rPr>
+              <a:t>moves</a:t>
+            </a:r>
+            <a:r>
+              <a:rPr lang="de-DE" sz="800" b="0" i="0" u="none" strike="noStrike" dirty="0">
+                <a:solidFill>
+                  <a:schemeClr val="tx1">
+                    <a:lumMod val="65000"/>
+                    <a:lumOff val="35000"/>
+                  </a:schemeClr>
+                </a:solidFill>
+                <a:effectLst/>
+                <a:latin typeface="Avenir Book" panose="02000503020000020003" pitchFamily="2" charset="0"/>
+              </a:rPr>
+              <a:t>-Trainingskarten von Regina Brandhuber sind lizenziert unter einer Creative Commons </a:t>
+            </a:r>
+          </a:p>
+          <a:p>
+            <a:pPr lvl="0" algn="ctr">
+              <a:defRPr sz="1800"/>
+            </a:pPr>
+            <a:r>
+              <a:rPr lang="de-DE" sz="800" b="0" i="0" u="none" strike="noStrike" dirty="0">
+                <a:solidFill>
+                  <a:schemeClr val="tx1">
+                    <a:lumMod val="65000"/>
+                    <a:lumOff val="35000"/>
+                  </a:schemeClr>
+                </a:solidFill>
+                <a:effectLst/>
+                <a:latin typeface="Avenir Book" panose="02000503020000020003" pitchFamily="2" charset="0"/>
+              </a:rPr>
+              <a:t>Namensnennung-Nicht kommerziell 4.0 International Lizenz.</a:t>
+            </a:r>
+          </a:p>
+          <a:p>
+            <a:pPr lvl="0" algn="ctr">
+              <a:defRPr sz="1800"/>
+            </a:pPr>
+            <a:r>
+              <a:rPr lang="de-DE" sz="800" dirty="0">
+                <a:solidFill>
+                  <a:schemeClr val="tx1">
+                    <a:lumMod val="65000"/>
+                    <a:lumOff val="35000"/>
+                  </a:schemeClr>
+                </a:solidFill>
+                <a:latin typeface="Avenir Book" panose="02000503020000020003" pitchFamily="2" charset="0"/>
+                <a:ea typeface="Calibri"/>
+                <a:cs typeface="Avenir Light"/>
+                <a:sym typeface="Calibri"/>
+              </a:rPr>
+              <a:t>Nachzulesen unter:</a:t>
+            </a:r>
+            <a:r>
+              <a:rPr sz="800" dirty="0">
+                <a:solidFill>
+                  <a:schemeClr val="tx1">
+                    <a:lumMod val="65000"/>
+                    <a:lumOff val="35000"/>
+                  </a:schemeClr>
+                </a:solidFill>
+                <a:latin typeface="Avenir Book" panose="02000503020000020003" pitchFamily="2" charset="0"/>
+                <a:ea typeface="Calibri"/>
+                <a:cs typeface="Avenir Light"/>
+                <a:sym typeface="Calibri"/>
+              </a:rPr>
+              <a:t> </a:t>
+            </a:r>
+            <a:r>
+              <a:rPr lang="de-DE" sz="800" dirty="0">
+                <a:solidFill>
+                  <a:schemeClr val="tx1">
+                    <a:lumMod val="65000"/>
+                    <a:lumOff val="35000"/>
+                  </a:schemeClr>
+                </a:solidFill>
+                <a:latin typeface="Avenir Book" panose="02000503020000020003" pitchFamily="2" charset="0"/>
+                <a:ea typeface="Calibri"/>
+                <a:cs typeface="Avenir Light"/>
+                <a:sym typeface="Calibri"/>
+              </a:rPr>
+              <a:t>https://</a:t>
+            </a:r>
+            <a:r>
+              <a:rPr lang="de-DE" sz="800" dirty="0" err="1">
+                <a:solidFill>
+                  <a:schemeClr val="tx1">
+                    <a:lumMod val="65000"/>
+                    <a:lumOff val="35000"/>
+                  </a:schemeClr>
+                </a:solidFill>
+                <a:latin typeface="Avenir Book" panose="02000503020000020003" pitchFamily="2" charset="0"/>
+                <a:ea typeface="Calibri"/>
+                <a:cs typeface="Avenir Light"/>
+                <a:sym typeface="Calibri"/>
+              </a:rPr>
+              <a:t>creativecommons.org</a:t>
+            </a:r>
+            <a:r>
+              <a:rPr lang="de-DE" sz="800" dirty="0">
+                <a:solidFill>
+                  <a:schemeClr val="tx1">
+                    <a:lumMod val="65000"/>
+                    <a:lumOff val="35000"/>
+                  </a:schemeClr>
+                </a:solidFill>
+                <a:latin typeface="Avenir Book" panose="02000503020000020003" pitchFamily="2" charset="0"/>
+                <a:ea typeface="Calibri"/>
+                <a:cs typeface="Avenir Light"/>
+                <a:sym typeface="Calibri"/>
+              </a:rPr>
+              <a:t>/</a:t>
+            </a:r>
+            <a:r>
+              <a:rPr lang="de-DE" sz="800" dirty="0" err="1">
+                <a:solidFill>
+                  <a:schemeClr val="tx1">
+                    <a:lumMod val="65000"/>
+                    <a:lumOff val="35000"/>
+                  </a:schemeClr>
+                </a:solidFill>
+                <a:latin typeface="Avenir Book" panose="02000503020000020003" pitchFamily="2" charset="0"/>
+                <a:ea typeface="Calibri"/>
+                <a:cs typeface="Avenir Light"/>
+                <a:sym typeface="Calibri"/>
+              </a:rPr>
+              <a:t>licenses</a:t>
+            </a:r>
+            <a:r>
+              <a:rPr lang="de-DE" sz="800" dirty="0">
+                <a:solidFill>
+                  <a:schemeClr val="tx1">
+                    <a:lumMod val="65000"/>
+                    <a:lumOff val="35000"/>
+                  </a:schemeClr>
+                </a:solidFill>
+                <a:latin typeface="Avenir Book" panose="02000503020000020003" pitchFamily="2" charset="0"/>
+                <a:ea typeface="Calibri"/>
+                <a:cs typeface="Avenir Light"/>
+                <a:sym typeface="Calibri"/>
+              </a:rPr>
+              <a:t>/</a:t>
+            </a:r>
+            <a:r>
+              <a:rPr lang="de-DE" sz="800" dirty="0" err="1">
+                <a:solidFill>
+                  <a:schemeClr val="tx1">
+                    <a:lumMod val="65000"/>
+                    <a:lumOff val="35000"/>
+                  </a:schemeClr>
+                </a:solidFill>
+                <a:latin typeface="Avenir Book" panose="02000503020000020003" pitchFamily="2" charset="0"/>
+                <a:ea typeface="Calibri"/>
+                <a:cs typeface="Avenir Light"/>
+                <a:sym typeface="Calibri"/>
+              </a:rPr>
+              <a:t>by-nc</a:t>
+            </a:r>
+            <a:r>
+              <a:rPr lang="de-DE" sz="800" dirty="0">
+                <a:solidFill>
+                  <a:schemeClr val="tx1">
+                    <a:lumMod val="65000"/>
+                    <a:lumOff val="35000"/>
+                  </a:schemeClr>
+                </a:solidFill>
+                <a:latin typeface="Avenir Book" panose="02000503020000020003" pitchFamily="2" charset="0"/>
+                <a:ea typeface="Calibri"/>
+                <a:cs typeface="Avenir Light"/>
+                <a:sym typeface="Calibri"/>
+              </a:rPr>
+              <a:t>/4.0/</a:t>
+            </a:r>
+            <a:r>
+              <a:rPr lang="de-DE" sz="800" dirty="0" err="1">
+                <a:solidFill>
+                  <a:schemeClr val="tx1">
+                    <a:lumMod val="65000"/>
+                    <a:lumOff val="35000"/>
+                  </a:schemeClr>
+                </a:solidFill>
+                <a:latin typeface="Avenir Book" panose="02000503020000020003" pitchFamily="2" charset="0"/>
+                <a:ea typeface="Calibri"/>
+                <a:cs typeface="Avenir Light"/>
+                <a:sym typeface="Calibri"/>
+              </a:rPr>
+              <a:t>deed.de</a:t>
+            </a:r>
+            <a:endParaRPr sz="800" dirty="0">
+              <a:solidFill>
+                <a:schemeClr val="tx1">
+                  <a:lumMod val="65000"/>
+                  <a:lumOff val="35000"/>
+                </a:schemeClr>
+              </a:solidFill>
+              <a:latin typeface="Avenir Book" panose="02000503020000020003" pitchFamily="2" charset="0"/>
+              <a:ea typeface="Calibri"/>
+              <a:cs typeface="Avenir Light"/>
+              <a:sym typeface="Calibri"/>
+            </a:endParaRPr>
+          </a:p>
+        </p:txBody>
+      </p:sp>
+      <p:pic>
+        <p:nvPicPr>
+          <p:cNvPr id="4" name="pasted-image.tif">
+            <a:extLst>
+              <a:ext uri="{FF2B5EF4-FFF2-40B4-BE49-F238E27FC236}">
+                <a16:creationId xmlns:a16="http://schemas.microsoft.com/office/drawing/2014/main" id="{54E47E44-09B3-51DF-5DA8-C5C50BCD6CBA}"/>
+              </a:ext>
+            </a:extLst>
+          </p:cNvPr>
+          <p:cNvPicPr/>
+          <p:nvPr/>
+        </p:nvPicPr>
+        <p:blipFill rotWithShape="1">
+          <a:blip r:embed="rId2"/>
+          <a:srcRect r="24777" b="-3233"/>
+          <a:stretch/>
+        </p:blipFill>
+        <p:spPr>
+          <a:xfrm>
+            <a:off x="5724347" y="4733926"/>
+            <a:ext cx="1009828" cy="333374"/>
+          </a:xfrm>
+          <a:prstGeom prst="rect">
+            <a:avLst/>
+          </a:prstGeom>
+          <a:ln w="12700">
+            <a:miter lim="400000"/>
+          </a:ln>
+        </p:spPr>
+      </p:pic>
     </p:spTree>
     <p:extLst>
       <p:ext uri="{BB962C8B-B14F-4D97-AF65-F5344CB8AC3E}">

</xml_diff>